<commit_message>
route added through to webservice; added new 'bus' module for the canonical form; updated docs.
</commit_message>
<xml_diff>
--- a/doc/sketch.pptx
+++ b/doc/sketch.pptx
@@ -288,7 +288,7 @@
           <a:p>
             <a:fld id="{0CCE3AC1-4140-4EB0-BEBB-7396398DDE33}" type="datetimeFigureOut">
               <a:rPr lang="en-GB" smtClean="0"/>
-              <a:t>28/03/2013</a:t>
+              <a:t>03/04/2013</a:t>
             </a:fld>
             <a:endParaRPr lang="en-GB"/>
           </a:p>
@@ -458,7 +458,7 @@
           <a:p>
             <a:fld id="{0CCE3AC1-4140-4EB0-BEBB-7396398DDE33}" type="datetimeFigureOut">
               <a:rPr lang="en-GB" smtClean="0"/>
-              <a:t>28/03/2013</a:t>
+              <a:t>03/04/2013</a:t>
             </a:fld>
             <a:endParaRPr lang="en-GB"/>
           </a:p>
@@ -638,7 +638,7 @@
           <a:p>
             <a:fld id="{0CCE3AC1-4140-4EB0-BEBB-7396398DDE33}" type="datetimeFigureOut">
               <a:rPr lang="en-GB" smtClean="0"/>
-              <a:t>28/03/2013</a:t>
+              <a:t>03/04/2013</a:t>
             </a:fld>
             <a:endParaRPr lang="en-GB"/>
           </a:p>
@@ -808,7 +808,7 @@
           <a:p>
             <a:fld id="{0CCE3AC1-4140-4EB0-BEBB-7396398DDE33}" type="datetimeFigureOut">
               <a:rPr lang="en-GB" smtClean="0"/>
-              <a:t>28/03/2013</a:t>
+              <a:t>03/04/2013</a:t>
             </a:fld>
             <a:endParaRPr lang="en-GB"/>
           </a:p>
@@ -1054,7 +1054,7 @@
           <a:p>
             <a:fld id="{0CCE3AC1-4140-4EB0-BEBB-7396398DDE33}" type="datetimeFigureOut">
               <a:rPr lang="en-GB" smtClean="0"/>
-              <a:t>28/03/2013</a:t>
+              <a:t>03/04/2013</a:t>
             </a:fld>
             <a:endParaRPr lang="en-GB"/>
           </a:p>
@@ -1342,7 +1342,7 @@
           <a:p>
             <a:fld id="{0CCE3AC1-4140-4EB0-BEBB-7396398DDE33}" type="datetimeFigureOut">
               <a:rPr lang="en-GB" smtClean="0"/>
-              <a:t>28/03/2013</a:t>
+              <a:t>03/04/2013</a:t>
             </a:fld>
             <a:endParaRPr lang="en-GB"/>
           </a:p>
@@ -1764,7 +1764,7 @@
           <a:p>
             <a:fld id="{0CCE3AC1-4140-4EB0-BEBB-7396398DDE33}" type="datetimeFigureOut">
               <a:rPr lang="en-GB" smtClean="0"/>
-              <a:t>28/03/2013</a:t>
+              <a:t>03/04/2013</a:t>
             </a:fld>
             <a:endParaRPr lang="en-GB"/>
           </a:p>
@@ -1882,7 +1882,7 @@
           <a:p>
             <a:fld id="{0CCE3AC1-4140-4EB0-BEBB-7396398DDE33}" type="datetimeFigureOut">
               <a:rPr lang="en-GB" smtClean="0"/>
-              <a:t>28/03/2013</a:t>
+              <a:t>03/04/2013</a:t>
             </a:fld>
             <a:endParaRPr lang="en-GB"/>
           </a:p>
@@ -1977,7 +1977,7 @@
           <a:p>
             <a:fld id="{0CCE3AC1-4140-4EB0-BEBB-7396398DDE33}" type="datetimeFigureOut">
               <a:rPr lang="en-GB" smtClean="0"/>
-              <a:t>28/03/2013</a:t>
+              <a:t>03/04/2013</a:t>
             </a:fld>
             <a:endParaRPr lang="en-GB"/>
           </a:p>
@@ -2254,7 +2254,7 @@
           <a:p>
             <a:fld id="{0CCE3AC1-4140-4EB0-BEBB-7396398DDE33}" type="datetimeFigureOut">
               <a:rPr lang="en-GB" smtClean="0"/>
-              <a:t>28/03/2013</a:t>
+              <a:t>03/04/2013</a:t>
             </a:fld>
             <a:endParaRPr lang="en-GB"/>
           </a:p>
@@ -2507,7 +2507,7 @@
           <a:p>
             <a:fld id="{0CCE3AC1-4140-4EB0-BEBB-7396398DDE33}" type="datetimeFigureOut">
               <a:rPr lang="en-GB" smtClean="0"/>
-              <a:t>28/03/2013</a:t>
+              <a:t>03/04/2013</a:t>
             </a:fld>
             <a:endParaRPr lang="en-GB"/>
           </a:p>
@@ -2720,7 +2720,7 @@
           <a:p>
             <a:fld id="{0CCE3AC1-4140-4EB0-BEBB-7396398DDE33}" type="datetimeFigureOut">
               <a:rPr lang="en-GB" smtClean="0"/>
-              <a:t>28/03/2013</a:t>
+              <a:t>03/04/2013</a:t>
             </a:fld>
             <a:endParaRPr lang="en-GB"/>
           </a:p>
@@ -3097,16 +3097,62 @@
       </p:grpSpPr>
       <p:sp>
         <p:nvSpPr>
-          <p:cNvPr id="23" name="Rectangle 22"/>
+          <p:cNvPr id="42" name="Rectangle 41"/>
           <p:cNvSpPr/>
           <p:nvPr/>
         </p:nvSpPr>
         <p:spPr>
           <a:xfrm>
-            <a:off x="251521" y="3789040"/>
-            <a:ext cx="2448271" cy="2016224"/>
+            <a:off x="2555776" y="3140968"/>
+            <a:ext cx="1847858" cy="2592288"/>
           </a:xfrm>
           <a:prstGeom prst="rect">
+            <a:avLst/>
+          </a:prstGeom>
+        </p:spPr>
+        <p:style>
+          <a:lnRef idx="2">
+            <a:schemeClr val="accent3"/>
+          </a:lnRef>
+          <a:fillRef idx="1">
+            <a:schemeClr val="lt1"/>
+          </a:fillRef>
+          <a:effectRef idx="0">
+            <a:schemeClr val="accent3"/>
+          </a:effectRef>
+          <a:fontRef idx="minor">
+            <a:schemeClr val="dk1"/>
+          </a:fontRef>
+        </p:style>
+        <p:txBody>
+          <a:bodyPr rot="0" spcFirstLastPara="0" vertOverflow="overflow" horzOverflow="overflow" vert="horz" wrap="square" lIns="91440" tIns="45720" rIns="91440" bIns="45720" numCol="1" spcCol="0" rtlCol="0" fromWordArt="0" anchor="b" anchorCtr="0" forceAA="0" compatLnSpc="1">
+            <a:prstTxWarp prst="textNoShape">
+              <a:avLst/>
+            </a:prstTxWarp>
+            <a:noAutofit/>
+          </a:bodyPr>
+          <a:lstStyle/>
+          <a:p>
+            <a:r>
+              <a:rPr lang="en-GB" dirty="0" smtClean="0"/>
+              <a:t>Publisher</a:t>
+            </a:r>
+            <a:endParaRPr lang="en-GB" dirty="0"/>
+          </a:p>
+        </p:txBody>
+      </p:sp>
+      <p:sp>
+        <p:nvSpPr>
+          <p:cNvPr id="4" name="Flowchart: Magnetic Disk 3"/>
+          <p:cNvSpPr/>
+          <p:nvPr/>
+        </p:nvSpPr>
+        <p:spPr>
+          <a:xfrm>
+            <a:off x="179512" y="4509120"/>
+            <a:ext cx="1584176" cy="1368152"/>
+          </a:xfrm>
+          <a:prstGeom prst="flowChartMagneticDisk">
             <a:avLst/>
           </a:prstGeom>
         </p:spPr>
@@ -3125,49 +3171,6 @@
           </a:fontRef>
         </p:style>
         <p:txBody>
-          <a:bodyPr rtlCol="0" anchor="b" anchorCtr="0"/>
-          <a:lstStyle/>
-          <a:p>
-            <a:r>
-              <a:rPr lang="en-GB" dirty="0" smtClean="0"/>
-              <a:t>MS SQL Server</a:t>
-            </a:r>
-            <a:endParaRPr lang="en-GB" dirty="0"/>
-          </a:p>
-        </p:txBody>
-      </p:sp>
-      <p:sp>
-        <p:nvSpPr>
-          <p:cNvPr id="4" name="Flowchart: Magnetic Disk 3"/>
-          <p:cNvSpPr/>
-          <p:nvPr/>
-        </p:nvSpPr>
-        <p:spPr>
-          <a:xfrm>
-            <a:off x="936001" y="4221088"/>
-            <a:ext cx="1368152" cy="1368152"/>
-          </a:xfrm>
-          <a:prstGeom prst="flowChartMagneticDisk">
-            <a:avLst/>
-          </a:prstGeom>
-        </p:spPr>
-        <p:style>
-          <a:lnRef idx="2">
-            <a:schemeClr val="accent1">
-              <a:shade val="50000"/>
-            </a:schemeClr>
-          </a:lnRef>
-          <a:fillRef idx="1">
-            <a:schemeClr val="accent1"/>
-          </a:fillRef>
-          <a:effectRef idx="0">
-            <a:schemeClr val="accent1"/>
-          </a:effectRef>
-          <a:fontRef idx="minor">
-            <a:schemeClr val="lt1"/>
-          </a:fontRef>
-        </p:style>
-        <p:txBody>
           <a:bodyPr rtlCol="0" anchor="ctr"/>
           <a:lstStyle/>
           <a:p>
@@ -3184,8 +3187,8 @@
         </p:nvGrpSpPr>
         <p:grpSpPr>
           <a:xfrm>
-            <a:off x="1588323" y="4905164"/>
-            <a:ext cx="601216" cy="324036"/>
+            <a:off x="395536" y="5092266"/>
+            <a:ext cx="1080120" cy="568982"/>
             <a:chOff x="1475656" y="2672916"/>
             <a:chExt cx="601216" cy="324036"/>
           </a:xfrm>
@@ -3207,15 +3210,15 @@
           </p:spPr>
           <p:style>
             <a:lnRef idx="2">
-              <a:schemeClr val="accent3">
+              <a:schemeClr val="accent5">
                 <a:shade val="50000"/>
               </a:schemeClr>
             </a:lnRef>
             <a:fillRef idx="1">
-              <a:schemeClr val="accent3"/>
+              <a:schemeClr val="accent5"/>
             </a:fillRef>
             <a:effectRef idx="0">
-              <a:schemeClr val="accent3"/>
+              <a:schemeClr val="accent5"/>
             </a:effectRef>
             <a:fontRef idx="minor">
               <a:schemeClr val="lt1"/>
@@ -3226,7 +3229,7 @@
             <a:lstStyle/>
             <a:p>
               <a:pPr algn="ctr"/>
-              <a:endParaRPr lang="en-GB"/>
+              <a:endParaRPr lang="en-GB" sz="1600"/>
             </a:p>
           </p:txBody>
         </p:sp>
@@ -3247,15 +3250,15 @@
           </p:spPr>
           <p:style>
             <a:lnRef idx="2">
-              <a:schemeClr val="accent3">
+              <a:schemeClr val="accent5">
                 <a:shade val="50000"/>
               </a:schemeClr>
             </a:lnRef>
             <a:fillRef idx="1">
-              <a:schemeClr val="accent3"/>
+              <a:schemeClr val="accent5"/>
             </a:fillRef>
             <a:effectRef idx="0">
-              <a:schemeClr val="accent3"/>
+              <a:schemeClr val="accent5"/>
             </a:effectRef>
             <a:fontRef idx="minor">
               <a:schemeClr val="lt1"/>
@@ -3266,7 +3269,7 @@
             <a:lstStyle/>
             <a:p>
               <a:pPr algn="ctr"/>
-              <a:endParaRPr lang="en-GB"/>
+              <a:endParaRPr lang="en-GB" sz="1600"/>
             </a:p>
           </p:txBody>
         </p:sp>
@@ -3287,15 +3290,15 @@
           </p:spPr>
           <p:style>
             <a:lnRef idx="2">
-              <a:schemeClr val="accent3">
+              <a:schemeClr val="accent5">
                 <a:shade val="50000"/>
               </a:schemeClr>
             </a:lnRef>
             <a:fillRef idx="1">
-              <a:schemeClr val="accent3"/>
+              <a:schemeClr val="accent5"/>
             </a:fillRef>
             <a:effectRef idx="0">
-              <a:schemeClr val="accent3"/>
+              <a:schemeClr val="accent5"/>
             </a:effectRef>
             <a:fontRef idx="minor">
               <a:schemeClr val="lt1"/>
@@ -3306,7 +3309,7 @@
             <a:lstStyle/>
             <a:p>
               <a:pPr algn="ctr"/>
-              <a:endParaRPr lang="en-GB"/>
+              <a:endParaRPr lang="en-GB" sz="1600"/>
             </a:p>
           </p:txBody>
         </p:sp>
@@ -3327,15 +3330,15 @@
           </p:spPr>
           <p:style>
             <a:lnRef idx="2">
-              <a:schemeClr val="accent3">
+              <a:schemeClr val="accent5">
                 <a:shade val="50000"/>
               </a:schemeClr>
             </a:lnRef>
             <a:fillRef idx="1">
-              <a:schemeClr val="accent3"/>
+              <a:schemeClr val="accent5"/>
             </a:fillRef>
             <a:effectRef idx="0">
-              <a:schemeClr val="accent3"/>
+              <a:schemeClr val="accent5"/>
             </a:effectRef>
             <a:fontRef idx="minor">
               <a:schemeClr val="lt1"/>
@@ -3346,7 +3349,7 @@
             <a:lstStyle/>
             <a:p>
               <a:pPr algn="ctr"/>
-              <a:endParaRPr lang="en-GB"/>
+              <a:endParaRPr lang="en-GB" sz="1600"/>
             </a:p>
           </p:txBody>
         </p:sp>
@@ -3367,15 +3370,15 @@
           </p:spPr>
           <p:style>
             <a:lnRef idx="2">
-              <a:schemeClr val="accent3">
+              <a:schemeClr val="accent5">
                 <a:shade val="50000"/>
               </a:schemeClr>
             </a:lnRef>
             <a:fillRef idx="1">
-              <a:schemeClr val="accent3"/>
+              <a:schemeClr val="accent5"/>
             </a:fillRef>
             <a:effectRef idx="0">
-              <a:schemeClr val="accent3"/>
+              <a:schemeClr val="accent5"/>
             </a:effectRef>
             <a:fontRef idx="minor">
               <a:schemeClr val="lt1"/>
@@ -3386,7 +3389,7 @@
             <a:lstStyle/>
             <a:p>
               <a:pPr algn="ctr"/>
-              <a:endParaRPr lang="en-GB"/>
+              <a:endParaRPr lang="en-GB" sz="1600"/>
             </a:p>
           </p:txBody>
         </p:sp>
@@ -3407,15 +3410,15 @@
           </p:spPr>
           <p:style>
             <a:lnRef idx="2">
-              <a:schemeClr val="accent3">
+              <a:schemeClr val="accent5">
                 <a:shade val="50000"/>
               </a:schemeClr>
             </a:lnRef>
             <a:fillRef idx="1">
-              <a:schemeClr val="accent3"/>
+              <a:schemeClr val="accent5"/>
             </a:fillRef>
             <a:effectRef idx="0">
-              <a:schemeClr val="accent3"/>
+              <a:schemeClr val="accent5"/>
             </a:effectRef>
             <a:fontRef idx="minor">
               <a:schemeClr val="lt1"/>
@@ -3426,7 +3429,7 @@
             <a:lstStyle/>
             <a:p>
               <a:pPr algn="ctr"/>
-              <a:endParaRPr lang="en-GB"/>
+              <a:endParaRPr lang="en-GB" sz="1600"/>
             </a:p>
           </p:txBody>
         </p:sp>
@@ -3447,15 +3450,15 @@
           </p:spPr>
           <p:style>
             <a:lnRef idx="2">
-              <a:schemeClr val="accent3">
+              <a:schemeClr val="accent5">
                 <a:shade val="50000"/>
               </a:schemeClr>
             </a:lnRef>
             <a:fillRef idx="1">
-              <a:schemeClr val="accent3"/>
+              <a:schemeClr val="accent5"/>
             </a:fillRef>
             <a:effectRef idx="0">
-              <a:schemeClr val="accent3"/>
+              <a:schemeClr val="accent5"/>
             </a:effectRef>
             <a:fontRef idx="minor">
               <a:schemeClr val="lt1"/>
@@ -3466,7 +3469,7 @@
             <a:lstStyle/>
             <a:p>
               <a:pPr algn="ctr"/>
-              <a:endParaRPr lang="en-GB"/>
+              <a:endParaRPr lang="en-GB" sz="1600"/>
             </a:p>
           </p:txBody>
         </p:sp>
@@ -3487,15 +3490,15 @@
           </p:spPr>
           <p:style>
             <a:lnRef idx="2">
-              <a:schemeClr val="accent3">
+              <a:schemeClr val="accent5">
                 <a:shade val="50000"/>
               </a:schemeClr>
             </a:lnRef>
             <a:fillRef idx="1">
-              <a:schemeClr val="accent3"/>
+              <a:schemeClr val="accent5"/>
             </a:fillRef>
             <a:effectRef idx="0">
-              <a:schemeClr val="accent3"/>
+              <a:schemeClr val="accent5"/>
             </a:effectRef>
             <a:fontRef idx="minor">
               <a:schemeClr val="lt1"/>
@@ -3506,7 +3509,7 @@
             <a:lstStyle/>
             <a:p>
               <a:pPr algn="ctr"/>
-              <a:endParaRPr lang="en-GB"/>
+              <a:endParaRPr lang="en-GB" sz="1600"/>
             </a:p>
           </p:txBody>
         </p:sp>
@@ -3527,15 +3530,15 @@
           </p:spPr>
           <p:style>
             <a:lnRef idx="2">
-              <a:schemeClr val="accent3">
+              <a:schemeClr val="accent5">
                 <a:shade val="50000"/>
               </a:schemeClr>
             </a:lnRef>
             <a:fillRef idx="1">
-              <a:schemeClr val="accent3"/>
+              <a:schemeClr val="accent5"/>
             </a:fillRef>
             <a:effectRef idx="0">
-              <a:schemeClr val="accent3"/>
+              <a:schemeClr val="accent5"/>
             </a:effectRef>
             <a:fontRef idx="minor">
               <a:schemeClr val="lt1"/>
@@ -3546,7 +3549,7 @@
             <a:lstStyle/>
             <a:p>
               <a:pPr algn="ctr"/>
-              <a:endParaRPr lang="en-GB"/>
+              <a:endParaRPr lang="en-GB" sz="1600"/>
             </a:p>
           </p:txBody>
         </p:sp>
@@ -3567,15 +3570,15 @@
           </p:spPr>
           <p:style>
             <a:lnRef idx="2">
-              <a:schemeClr val="accent3">
+              <a:schemeClr val="accent5">
                 <a:shade val="50000"/>
               </a:schemeClr>
             </a:lnRef>
             <a:fillRef idx="1">
-              <a:schemeClr val="accent3"/>
+              <a:schemeClr val="accent5"/>
             </a:fillRef>
             <a:effectRef idx="0">
-              <a:schemeClr val="accent3"/>
+              <a:schemeClr val="accent5"/>
             </a:effectRef>
             <a:fontRef idx="minor">
               <a:schemeClr val="lt1"/>
@@ -3586,7 +3589,7 @@
             <a:lstStyle/>
             <a:p>
               <a:pPr algn="ctr"/>
-              <a:endParaRPr lang="en-GB"/>
+              <a:endParaRPr lang="en-GB" sz="1600"/>
             </a:p>
           </p:txBody>
         </p:sp>
@@ -3607,15 +3610,15 @@
           </p:spPr>
           <p:style>
             <a:lnRef idx="2">
-              <a:schemeClr val="accent3">
+              <a:schemeClr val="accent5">
                 <a:shade val="50000"/>
               </a:schemeClr>
             </a:lnRef>
             <a:fillRef idx="1">
-              <a:schemeClr val="accent3"/>
+              <a:schemeClr val="accent5"/>
             </a:fillRef>
             <a:effectRef idx="0">
-              <a:schemeClr val="accent3"/>
+              <a:schemeClr val="accent5"/>
             </a:effectRef>
             <a:fontRef idx="minor">
               <a:schemeClr val="lt1"/>
@@ -3626,7 +3629,7 @@
             <a:lstStyle/>
             <a:p>
               <a:pPr algn="ctr"/>
-              <a:endParaRPr lang="en-GB"/>
+              <a:endParaRPr lang="en-GB" sz="1600"/>
             </a:p>
           </p:txBody>
         </p:sp>
@@ -3647,15 +3650,15 @@
           </p:spPr>
           <p:style>
             <a:lnRef idx="2">
-              <a:schemeClr val="accent3">
+              <a:schemeClr val="accent5">
                 <a:shade val="50000"/>
               </a:schemeClr>
             </a:lnRef>
             <a:fillRef idx="1">
-              <a:schemeClr val="accent3"/>
+              <a:schemeClr val="accent5"/>
             </a:fillRef>
             <a:effectRef idx="0">
-              <a:schemeClr val="accent3"/>
+              <a:schemeClr val="accent5"/>
             </a:effectRef>
             <a:fontRef idx="minor">
               <a:schemeClr val="lt1"/>
@@ -3666,7 +3669,7 @@
             <a:lstStyle/>
             <a:p>
               <a:pPr algn="ctr"/>
-              <a:endParaRPr lang="en-GB"/>
+              <a:endParaRPr lang="en-GB" sz="1600"/>
             </a:p>
           </p:txBody>
         </p:sp>
@@ -3679,8 +3682,8 @@
         </p:nvSpPr>
         <p:spPr>
           <a:xfrm>
-            <a:off x="3144542" y="692696"/>
-            <a:ext cx="2448272" cy="2520280"/>
+            <a:off x="2555776" y="620688"/>
+            <a:ext cx="3988281" cy="2376264"/>
           </a:xfrm>
           <a:prstGeom prst="rect">
             <a:avLst/>
@@ -3688,13 +3691,13 @@
         </p:spPr>
         <p:style>
           <a:lnRef idx="2">
-            <a:schemeClr val="accent3"/>
+            <a:schemeClr val="dk1"/>
           </a:lnRef>
           <a:fillRef idx="1">
             <a:schemeClr val="lt1"/>
           </a:fillRef>
           <a:effectRef idx="0">
-            <a:schemeClr val="accent3"/>
+            <a:schemeClr val="dk1"/>
           </a:effectRef>
           <a:fontRef idx="minor">
             <a:schemeClr val="dk1"/>
@@ -3736,8 +3739,8 @@
         </p:nvSpPr>
         <p:spPr>
           <a:xfrm>
-            <a:off x="251520" y="692696"/>
-            <a:ext cx="2448271" cy="2520280"/>
+            <a:off x="179512" y="620688"/>
+            <a:ext cx="2016223" cy="2376264"/>
           </a:xfrm>
           <a:prstGeom prst="rect">
             <a:avLst/>
@@ -3797,7 +3800,7 @@
         </p:nvSpPr>
         <p:spPr>
           <a:xfrm>
-            <a:off x="3288558" y="2348880"/>
+            <a:off x="2712494" y="3483006"/>
             <a:ext cx="1512168" cy="720080"/>
           </a:xfrm>
           <a:prstGeom prst="roundRect">
@@ -3806,15 +3809,15 @@
         </p:spPr>
         <p:style>
           <a:lnRef idx="2">
-            <a:schemeClr val="accent1">
+            <a:schemeClr val="accent3">
               <a:shade val="50000"/>
             </a:schemeClr>
           </a:lnRef>
           <a:fillRef idx="1">
-            <a:schemeClr val="accent1"/>
+            <a:schemeClr val="accent3"/>
           </a:fillRef>
           <a:effectRef idx="0">
-            <a:schemeClr val="accent1"/>
+            <a:schemeClr val="accent3"/>
           </a:effectRef>
           <a:fontRef idx="minor">
             <a:schemeClr val="lt1"/>
@@ -3859,7 +3862,7 @@
         </p:nvSpPr>
         <p:spPr>
           <a:xfrm>
-            <a:off x="696270" y="2348880"/>
+            <a:off x="395536" y="1988840"/>
             <a:ext cx="1512168" cy="720080"/>
           </a:xfrm>
           <a:prstGeom prst="roundRect">
@@ -3868,15 +3871,15 @@
         </p:spPr>
         <p:style>
           <a:lnRef idx="2">
-            <a:schemeClr val="accent1">
+            <a:schemeClr val="accent5">
               <a:shade val="50000"/>
             </a:schemeClr>
           </a:lnRef>
           <a:fillRef idx="1">
-            <a:schemeClr val="accent1"/>
+            <a:schemeClr val="accent5"/>
           </a:fillRef>
           <a:effectRef idx="0">
-            <a:schemeClr val="accent1"/>
+            <a:schemeClr val="accent5"/>
           </a:effectRef>
           <a:fontRef idx="minor">
             <a:schemeClr val="lt1"/>
@@ -3921,8 +3924,8 @@
         </p:nvSpPr>
         <p:spPr>
           <a:xfrm>
-            <a:off x="6347850" y="3987062"/>
-            <a:ext cx="2448272" cy="1944216"/>
+            <a:off x="6876256" y="620688"/>
+            <a:ext cx="2088232" cy="2376264"/>
           </a:xfrm>
           <a:prstGeom prst="rect">
             <a:avLst/>
@@ -3943,7 +3946,7 @@
           </a:fontRef>
         </p:style>
         <p:txBody>
-          <a:bodyPr rot="0" spcFirstLastPara="0" vertOverflow="overflow" horzOverflow="overflow" vert="horz" wrap="square" lIns="91440" tIns="45720" rIns="91440" bIns="45720" numCol="1" spcCol="0" rtlCol="0" fromWordArt="0" anchor="b" anchorCtr="0" forceAA="0" compatLnSpc="1">
+          <a:bodyPr rot="0" spcFirstLastPara="0" vertOverflow="overflow" horzOverflow="overflow" vert="horz" wrap="square" lIns="91440" tIns="45720" rIns="91440" bIns="45720" numCol="1" spcCol="0" rtlCol="0" fromWordArt="0" anchor="t" anchorCtr="0" forceAA="0" compatLnSpc="1">
             <a:prstTxWarp prst="textNoShape">
               <a:avLst/>
             </a:prstTxWarp>
@@ -3953,8 +3956,12 @@
           <a:p>
             <a:pPr algn="r"/>
             <a:r>
+              <a:rPr lang="en-GB" dirty="0" err="1" smtClean="0"/>
+              <a:t>SoapSubscriberStub</a:t>
+            </a:r>
+            <a:r>
               <a:rPr lang="en-GB" dirty="0" smtClean="0"/>
-              <a:t>CXF Target</a:t>
+              <a:t/>
             </a:r>
             <a:br>
               <a:rPr lang="en-GB" dirty="0" smtClean="0"/>
@@ -3969,106 +3976,13 @@
       </p:sp>
       <p:sp>
         <p:nvSpPr>
-          <p:cNvPr id="21" name="Flowchart: Document 20"/>
-          <p:cNvSpPr/>
-          <p:nvPr/>
-        </p:nvSpPr>
-        <p:spPr>
-          <a:xfrm>
-            <a:off x="4860032" y="5067182"/>
-            <a:ext cx="1103428" cy="604391"/>
-          </a:xfrm>
-          <a:prstGeom prst="flowChartDocument">
-            <a:avLst/>
-          </a:prstGeom>
-        </p:spPr>
-        <p:style>
-          <a:lnRef idx="2">
-            <a:schemeClr val="accent5"/>
-          </a:lnRef>
-          <a:fillRef idx="1">
-            <a:schemeClr val="lt1"/>
-          </a:fillRef>
-          <a:effectRef idx="0">
-            <a:schemeClr val="accent5"/>
-          </a:effectRef>
-          <a:fontRef idx="minor">
-            <a:schemeClr val="dk1"/>
-          </a:fontRef>
-        </p:style>
-        <p:txBody>
-          <a:bodyPr rtlCol="0" anchor="ctr"/>
-          <a:lstStyle/>
-          <a:p>
-            <a:pPr algn="ctr"/>
-            <a:r>
-              <a:rPr lang="en-GB" sz="1400" dirty="0" smtClean="0"/>
-              <a:t>WSDL</a:t>
-            </a:r>
-            <a:endParaRPr lang="en-GB" sz="1400" dirty="0"/>
-          </a:p>
-        </p:txBody>
-      </p:sp>
-      <p:sp>
-        <p:nvSpPr>
-          <p:cNvPr id="31" name="Rounded Rectangle 30"/>
-          <p:cNvSpPr/>
-          <p:nvPr/>
-        </p:nvSpPr>
-        <p:spPr>
-          <a:xfrm>
-            <a:off x="6516216" y="4293096"/>
-            <a:ext cx="1512168" cy="720080"/>
-          </a:xfrm>
-          <a:prstGeom prst="roundRect">
-            <a:avLst/>
-          </a:prstGeom>
-        </p:spPr>
-        <p:style>
-          <a:lnRef idx="2">
-            <a:schemeClr val="accent1">
-              <a:shade val="50000"/>
-            </a:schemeClr>
-          </a:lnRef>
-          <a:fillRef idx="1">
-            <a:schemeClr val="accent1"/>
-          </a:fillRef>
-          <a:effectRef idx="0">
-            <a:schemeClr val="accent1"/>
-          </a:effectRef>
-          <a:fontRef idx="minor">
-            <a:schemeClr val="lt1"/>
-          </a:fontRef>
-        </p:style>
-        <p:txBody>
-          <a:bodyPr rtlCol="0" anchor="ctr"/>
-          <a:lstStyle/>
-          <a:p>
-            <a:pPr algn="ctr"/>
-            <a:r>
-              <a:rPr lang="en-GB" dirty="0" smtClean="0"/>
-              <a:t>SOAP</a:t>
-            </a:r>
-            <a:br>
-              <a:rPr lang="en-GB" dirty="0" smtClean="0"/>
-            </a:br>
-            <a:r>
-              <a:rPr lang="en-GB" dirty="0" smtClean="0"/>
-              <a:t>Web Service</a:t>
-            </a:r>
-            <a:endParaRPr lang="en-GB" dirty="0"/>
-          </a:p>
-        </p:txBody>
-      </p:sp>
-      <p:sp>
-        <p:nvSpPr>
           <p:cNvPr id="32" name="Flowchart: Document 31"/>
           <p:cNvSpPr/>
           <p:nvPr/>
         </p:nvSpPr>
         <p:spPr>
           <a:xfrm>
-            <a:off x="4139952" y="1268760"/>
+            <a:off x="3923928" y="1700808"/>
             <a:ext cx="1103428" cy="720080"/>
           </a:xfrm>
           <a:prstGeom prst="flowChartDocument">
@@ -4077,13 +3991,13 @@
         </p:spPr>
         <p:style>
           <a:lnRef idx="2">
-            <a:schemeClr val="accent5"/>
+            <a:schemeClr val="dk1"/>
           </a:lnRef>
           <a:fillRef idx="1">
             <a:schemeClr val="lt1"/>
           </a:fillRef>
           <a:effectRef idx="0">
-            <a:schemeClr val="accent5"/>
+            <a:schemeClr val="dk1"/>
           </a:effectRef>
           <a:fontRef idx="minor">
             <a:schemeClr val="dk1"/>
@@ -4113,8 +4027,8 @@
         </p:nvCxnSpPr>
         <p:spPr>
           <a:xfrm rot="5400000" flipH="1" flipV="1">
-            <a:off x="3732257" y="1941185"/>
-            <a:ext cx="720080" cy="95310"/>
+            <a:off x="2985174" y="2544252"/>
+            <a:ext cx="1422158" cy="455350"/>
           </a:xfrm>
           <a:prstGeom prst="curvedConnector2">
             <a:avLst/>
@@ -4149,17 +4063,19 @@
           <p:cNvPr id="38" name="Curved Connector 37"/>
           <p:cNvCxnSpPr>
             <a:stCxn id="12" idx="3"/>
-            <a:endCxn id="20" idx="2"/>
+            <a:endCxn id="20" idx="1"/>
           </p:cNvCxnSpPr>
           <p:nvPr/>
         </p:nvCxnSpPr>
         <p:spPr>
           <a:xfrm flipV="1">
-            <a:off x="2189539" y="3068960"/>
-            <a:ext cx="1855103" cy="1998222"/>
+            <a:off x="1475656" y="3843046"/>
+            <a:ext cx="1236838" cy="1533712"/>
           </a:xfrm>
-          <a:prstGeom prst="curvedConnector2">
-            <a:avLst/>
+          <a:prstGeom prst="curvedConnector3">
+            <a:avLst>
+              <a:gd name="adj1" fmla="val 50000"/>
+            </a:avLst>
           </a:prstGeom>
           <a:ln w="25400">
             <a:solidFill>
@@ -4197,9 +4113,9 @@
           <p:nvPr/>
         </p:nvCxnSpPr>
         <p:spPr>
-          <a:xfrm rot="16200000" flipH="1">
-            <a:off x="714440" y="3806873"/>
-            <a:ext cx="1836204" cy="360377"/>
+          <a:xfrm rot="5400000">
+            <a:off x="-216513" y="3724133"/>
+            <a:ext cx="2383346" cy="352921"/>
           </a:xfrm>
           <a:prstGeom prst="curvedConnector3">
             <a:avLst>
@@ -4231,6 +4147,268 @@
           </a:fontRef>
         </p:style>
       </p:cxnSp>
+      <p:sp>
+        <p:nvSpPr>
+          <p:cNvPr id="52" name="TextBox 51"/>
+          <p:cNvSpPr txBox="1"/>
+          <p:nvPr/>
+        </p:nvSpPr>
+        <p:spPr>
+          <a:xfrm>
+            <a:off x="6948264" y="4797152"/>
+            <a:ext cx="1410899" cy="646331"/>
+          </a:xfrm>
+          <a:prstGeom prst="rect">
+            <a:avLst/>
+          </a:prstGeom>
+          <a:noFill/>
+        </p:spPr>
+        <p:txBody>
+          <a:bodyPr wrap="none" rtlCol="0">
+            <a:spAutoFit/>
+          </a:bodyPr>
+          <a:lstStyle/>
+          <a:p>
+            <a:r>
+              <a:rPr lang="en-GB" sz="1200" dirty="0" smtClean="0"/>
+              <a:t>Compile-time</a:t>
+            </a:r>
+            <a:br>
+              <a:rPr lang="en-GB" sz="1200" dirty="0" smtClean="0"/>
+            </a:br>
+            <a:r>
+              <a:rPr lang="en-GB" sz="1200" dirty="0" smtClean="0"/>
+              <a:t>generation</a:t>
+            </a:r>
+            <a:br>
+              <a:rPr lang="en-GB" sz="1200" dirty="0" smtClean="0"/>
+            </a:br>
+            <a:r>
+              <a:rPr lang="en-GB" sz="1200" dirty="0" smtClean="0"/>
+              <a:t>from WSDL (</a:t>
+            </a:r>
+            <a:r>
+              <a:rPr lang="en-GB" sz="1200" dirty="0" smtClean="0"/>
+              <a:t>doc-lit)</a:t>
+            </a:r>
+            <a:endParaRPr lang="en-GB" sz="1200" dirty="0"/>
+          </a:p>
+        </p:txBody>
+      </p:sp>
+      <p:sp>
+        <p:nvSpPr>
+          <p:cNvPr id="53" name="TextBox 52"/>
+          <p:cNvSpPr txBox="1"/>
+          <p:nvPr/>
+        </p:nvSpPr>
+        <p:spPr>
+          <a:xfrm>
+            <a:off x="911424" y="4062263"/>
+            <a:ext cx="1393202" cy="461665"/>
+          </a:xfrm>
+          <a:prstGeom prst="rect">
+            <a:avLst/>
+          </a:prstGeom>
+          <a:noFill/>
+        </p:spPr>
+        <p:txBody>
+          <a:bodyPr wrap="none" rtlCol="0">
+            <a:spAutoFit/>
+          </a:bodyPr>
+          <a:lstStyle/>
+          <a:p>
+            <a:pPr algn="ctr"/>
+            <a:r>
+              <a:rPr lang="en-GB" sz="1200" dirty="0" smtClean="0"/>
+              <a:t>Query then invokes</a:t>
+            </a:r>
+            <a:br>
+              <a:rPr lang="en-GB" sz="1200" dirty="0" smtClean="0"/>
+            </a:br>
+            <a:r>
+              <a:rPr lang="en-GB" sz="1200" dirty="0" smtClean="0"/>
+              <a:t>@Consumed</a:t>
+            </a:r>
+            <a:endParaRPr lang="en-GB" sz="1200" dirty="0"/>
+          </a:p>
+        </p:txBody>
+      </p:sp>
+      <p:sp>
+        <p:nvSpPr>
+          <p:cNvPr id="55" name="TextBox 54"/>
+          <p:cNvSpPr txBox="1"/>
+          <p:nvPr/>
+        </p:nvSpPr>
+        <p:spPr>
+          <a:xfrm>
+            <a:off x="323528" y="3039343"/>
+            <a:ext cx="1484509" cy="461665"/>
+          </a:xfrm>
+          <a:prstGeom prst="rect">
+            <a:avLst/>
+          </a:prstGeom>
+          <a:noFill/>
+        </p:spPr>
+        <p:txBody>
+          <a:bodyPr wrap="none" rtlCol="0">
+            <a:spAutoFit/>
+          </a:bodyPr>
+          <a:lstStyle/>
+          <a:p>
+            <a:r>
+              <a:rPr lang="en-GB" sz="1200" dirty="0" smtClean="0"/>
+              <a:t>Persisted by</a:t>
+            </a:r>
+            <a:br>
+              <a:rPr lang="en-GB" sz="1200" dirty="0" smtClean="0"/>
+            </a:br>
+            <a:r>
+              <a:rPr lang="en-GB" sz="1200" dirty="0" err="1" smtClean="0"/>
+              <a:t>PublishingServiceJdo</a:t>
+            </a:r>
+            <a:endParaRPr lang="en-GB" sz="1200" dirty="0"/>
+          </a:p>
+        </p:txBody>
+      </p:sp>
+      <p:sp>
+        <p:nvSpPr>
+          <p:cNvPr id="47" name="Rectangle 46"/>
+          <p:cNvSpPr/>
+          <p:nvPr/>
+        </p:nvSpPr>
+        <p:spPr>
+          <a:xfrm>
+            <a:off x="4475642" y="3140968"/>
+            <a:ext cx="2068415" cy="2592288"/>
+          </a:xfrm>
+          <a:prstGeom prst="rect">
+            <a:avLst/>
+          </a:prstGeom>
+        </p:spPr>
+        <p:style>
+          <a:lnRef idx="2">
+            <a:schemeClr val="accent4"/>
+          </a:lnRef>
+          <a:fillRef idx="1">
+            <a:schemeClr val="lt1"/>
+          </a:fillRef>
+          <a:effectRef idx="0">
+            <a:schemeClr val="accent4"/>
+          </a:effectRef>
+          <a:fontRef idx="minor">
+            <a:schemeClr val="dk1"/>
+          </a:fontRef>
+        </p:style>
+        <p:txBody>
+          <a:bodyPr rot="0" spcFirstLastPara="0" vertOverflow="overflow" horzOverflow="overflow" vert="horz" wrap="square" lIns="91440" tIns="45720" rIns="91440" bIns="45720" numCol="1" spcCol="0" rtlCol="0" fromWordArt="0" anchor="b" anchorCtr="0" forceAA="0" compatLnSpc="1">
+            <a:prstTxWarp prst="textNoShape">
+              <a:avLst/>
+            </a:prstTxWarp>
+            <a:noAutofit/>
+          </a:bodyPr>
+          <a:lstStyle/>
+          <a:p>
+            <a:r>
+              <a:rPr lang="en-GB" dirty="0" err="1" smtClean="0"/>
+              <a:t>SoapSubscriber</a:t>
+            </a:r>
+            <a:endParaRPr lang="en-GB" dirty="0"/>
+          </a:p>
+        </p:txBody>
+      </p:sp>
+      <p:sp>
+        <p:nvSpPr>
+          <p:cNvPr id="21" name="Flowchart: Document 20"/>
+          <p:cNvSpPr/>
+          <p:nvPr/>
+        </p:nvSpPr>
+        <p:spPr>
+          <a:xfrm>
+            <a:off x="7111719" y="4221088"/>
+            <a:ext cx="1103428" cy="604391"/>
+          </a:xfrm>
+          <a:prstGeom prst="flowChartDocument">
+            <a:avLst/>
+          </a:prstGeom>
+        </p:spPr>
+        <p:style>
+          <a:lnRef idx="2">
+            <a:schemeClr val="accent4"/>
+          </a:lnRef>
+          <a:fillRef idx="1">
+            <a:schemeClr val="lt1"/>
+          </a:fillRef>
+          <a:effectRef idx="0">
+            <a:schemeClr val="accent4"/>
+          </a:effectRef>
+          <a:fontRef idx="minor">
+            <a:schemeClr val="dk1"/>
+          </a:fontRef>
+        </p:style>
+        <p:txBody>
+          <a:bodyPr rtlCol="0" anchor="ctr"/>
+          <a:lstStyle/>
+          <a:p>
+            <a:pPr algn="ctr"/>
+            <a:r>
+              <a:rPr lang="en-GB" sz="1400" dirty="0" smtClean="0"/>
+              <a:t>WSDL</a:t>
+            </a:r>
+            <a:endParaRPr lang="en-GB" sz="1400" dirty="0"/>
+          </a:p>
+        </p:txBody>
+      </p:sp>
+      <p:sp>
+        <p:nvSpPr>
+          <p:cNvPr id="31" name="Rounded Rectangle 30"/>
+          <p:cNvSpPr/>
+          <p:nvPr/>
+        </p:nvSpPr>
+        <p:spPr>
+          <a:xfrm>
+            <a:off x="4640689" y="3429000"/>
+            <a:ext cx="1512168" cy="720080"/>
+          </a:xfrm>
+          <a:prstGeom prst="roundRect">
+            <a:avLst/>
+          </a:prstGeom>
+        </p:spPr>
+        <p:style>
+          <a:lnRef idx="2">
+            <a:schemeClr val="accent4">
+              <a:shade val="50000"/>
+            </a:schemeClr>
+          </a:lnRef>
+          <a:fillRef idx="1">
+            <a:schemeClr val="accent4"/>
+          </a:fillRef>
+          <a:effectRef idx="0">
+            <a:schemeClr val="accent4"/>
+          </a:effectRef>
+          <a:fontRef idx="minor">
+            <a:schemeClr val="lt1"/>
+          </a:fontRef>
+        </p:style>
+        <p:txBody>
+          <a:bodyPr rtlCol="0" anchor="ctr"/>
+          <a:lstStyle/>
+          <a:p>
+            <a:pPr algn="ctr"/>
+            <a:r>
+              <a:rPr lang="en-GB" dirty="0" smtClean="0"/>
+              <a:t>SOAP</a:t>
+            </a:r>
+            <a:br>
+              <a:rPr lang="en-GB" dirty="0" smtClean="0"/>
+            </a:br>
+            <a:r>
+              <a:rPr lang="en-GB" dirty="0" smtClean="0"/>
+              <a:t>Web Service</a:t>
+            </a:r>
+            <a:endParaRPr lang="en-GB" dirty="0"/>
+          </a:p>
+        </p:txBody>
+      </p:sp>
       <p:cxnSp>
         <p:nvCxnSpPr>
           <p:cNvPr id="45" name="Curved Connector 44"/>
@@ -4242,8 +4420,8 @@
         </p:nvCxnSpPr>
         <p:spPr>
           <a:xfrm>
-            <a:off x="5243380" y="1628800"/>
-            <a:ext cx="2028920" cy="2664296"/>
+            <a:off x="5027356" y="2060848"/>
+            <a:ext cx="369417" cy="1368152"/>
           </a:xfrm>
           <a:prstGeom prst="curvedConnector2">
             <a:avLst/>
@@ -4275,35 +4453,33 @@
       </p:cxnSp>
       <p:sp>
         <p:nvSpPr>
-          <p:cNvPr id="48" name="Rounded Rectangular Callout 47"/>
+          <p:cNvPr id="50" name="Rounded Rectangle 49"/>
           <p:cNvSpPr/>
           <p:nvPr/>
         </p:nvSpPr>
         <p:spPr>
           <a:xfrm>
-            <a:off x="7380312" y="476672"/>
-            <a:ext cx="1440160" cy="504056"/>
+            <a:off x="7264698" y="1988840"/>
+            <a:ext cx="1512168" cy="720080"/>
           </a:xfrm>
-          <a:prstGeom prst="wedgeRoundRectCallout">
-            <a:avLst>
-              <a:gd name="adj1" fmla="val -171629"/>
-              <a:gd name="adj2" fmla="val 36388"/>
-              <a:gd name="adj3" fmla="val 16667"/>
-            </a:avLst>
+          <a:prstGeom prst="roundRect">
+            <a:avLst/>
           </a:prstGeom>
         </p:spPr>
         <p:style>
-          <a:lnRef idx="1">
-            <a:schemeClr val="dk1"/>
+          <a:lnRef idx="2">
+            <a:schemeClr val="accent4">
+              <a:shade val="50000"/>
+            </a:schemeClr>
           </a:lnRef>
-          <a:fillRef idx="2">
-            <a:schemeClr val="dk1"/>
+          <a:fillRef idx="1">
+            <a:schemeClr val="accent4"/>
           </a:fillRef>
-          <a:effectRef idx="1">
-            <a:schemeClr val="dk1"/>
+          <a:effectRef idx="0">
+            <a:schemeClr val="accent4"/>
           </a:effectRef>
           <a:fontRef idx="minor">
-            <a:schemeClr val="dk1"/>
+            <a:schemeClr val="lt1"/>
           </a:fontRef>
         </p:style>
         <p:txBody>
@@ -4312,56 +4488,14 @@
           <a:p>
             <a:pPr algn="ctr"/>
             <a:r>
-              <a:rPr lang="en-GB" sz="1200" dirty="0" smtClean="0"/>
-              <a:t>The scope of this project</a:t>
-            </a:r>
-            <a:endParaRPr lang="en-GB" sz="1200" dirty="0"/>
-          </a:p>
-        </p:txBody>
-      </p:sp>
-      <p:sp>
-        <p:nvSpPr>
-          <p:cNvPr id="49" name="Rounded Rectangular Callout 48"/>
-          <p:cNvSpPr/>
-          <p:nvPr/>
-        </p:nvSpPr>
-        <p:spPr>
-          <a:xfrm>
-            <a:off x="7380312" y="2684917"/>
-            <a:ext cx="1440160" cy="744083"/>
-          </a:xfrm>
-          <a:prstGeom prst="wedgeRoundRectCallout">
-            <a:avLst>
-              <a:gd name="adj1" fmla="val -31656"/>
-              <a:gd name="adj2" fmla="val 113793"/>
-              <a:gd name="adj3" fmla="val 16667"/>
-            </a:avLst>
-          </a:prstGeom>
-        </p:spPr>
-        <p:style>
-          <a:lnRef idx="1">
-            <a:schemeClr val="dk1"/>
-          </a:lnRef>
-          <a:fillRef idx="2">
-            <a:schemeClr val="dk1"/>
-          </a:fillRef>
-          <a:effectRef idx="1">
-            <a:schemeClr val="dk1"/>
-          </a:effectRef>
-          <a:fontRef idx="minor">
-            <a:schemeClr val="dk1"/>
-          </a:fontRef>
-        </p:style>
-        <p:txBody>
-          <a:bodyPr rtlCol="0" anchor="ctr"/>
-          <a:lstStyle/>
-          <a:p>
-            <a:pPr algn="ctr"/>
-            <a:r>
-              <a:rPr lang="en-GB" sz="1200" dirty="0" smtClean="0"/>
-              <a:t>Also part of this project (for testing purposes)</a:t>
-            </a:r>
-            <a:endParaRPr lang="en-GB" sz="1200" dirty="0"/>
+              <a:rPr lang="en-GB" dirty="0" smtClean="0"/>
+              <a:t>Web Service </a:t>
+            </a:r>
+            <a:r>
+              <a:rPr lang="en-GB" dirty="0" err="1" smtClean="0"/>
+              <a:t>Impl</a:t>
+            </a:r>
+            <a:endParaRPr lang="en-GB" dirty="0"/>
           </a:p>
         </p:txBody>
       </p:sp>
@@ -4369,15 +4503,15 @@
         <p:nvCxnSpPr>
           <p:cNvPr id="51" name="Curved Connector 50"/>
           <p:cNvCxnSpPr>
-            <a:stCxn id="21" idx="0"/>
-            <a:endCxn id="31" idx="1"/>
+            <a:stCxn id="21" idx="1"/>
+            <a:endCxn id="31" idx="2"/>
           </p:cNvCxnSpPr>
           <p:nvPr/>
         </p:nvCxnSpPr>
         <p:spPr>
-          <a:xfrm rot="5400000" flipH="1" flipV="1">
-            <a:off x="5756958" y="4307924"/>
-            <a:ext cx="414046" cy="1104470"/>
+          <a:xfrm rot="10800000">
+            <a:off x="5396773" y="4149080"/>
+            <a:ext cx="1714946" cy="374204"/>
           </a:xfrm>
           <a:prstGeom prst="curvedConnector2">
             <a:avLst/>
@@ -4404,14 +4538,302 @@
       </p:cxnSp>
       <p:sp>
         <p:nvSpPr>
-          <p:cNvPr id="52" name="TextBox 51"/>
+          <p:cNvPr id="58" name="Rounded Rectangle 57"/>
+          <p:cNvSpPr/>
+          <p:nvPr/>
+        </p:nvSpPr>
+        <p:spPr>
+          <a:xfrm>
+            <a:off x="4691666" y="4581128"/>
+            <a:ext cx="1512168" cy="720080"/>
+          </a:xfrm>
+          <a:prstGeom prst="roundRect">
+            <a:avLst/>
+          </a:prstGeom>
+        </p:spPr>
+        <p:style>
+          <a:lnRef idx="2">
+            <a:schemeClr val="accent4">
+              <a:shade val="50000"/>
+            </a:schemeClr>
+          </a:lnRef>
+          <a:fillRef idx="1">
+            <a:schemeClr val="accent4"/>
+          </a:fillRef>
+          <a:effectRef idx="0">
+            <a:schemeClr val="accent4"/>
+          </a:effectRef>
+          <a:fontRef idx="minor">
+            <a:schemeClr val="lt1"/>
+          </a:fontRef>
+        </p:style>
+        <p:txBody>
+          <a:bodyPr rtlCol="0" anchor="ctr"/>
+          <a:lstStyle/>
+          <a:p>
+            <a:pPr algn="ctr"/>
+            <a:r>
+              <a:rPr lang="en-GB" sz="1400" dirty="0" smtClean="0"/>
+              <a:t>Transformer</a:t>
+            </a:r>
+            <a:br>
+              <a:rPr lang="en-GB" sz="1400" dirty="0" smtClean="0"/>
+            </a:br>
+            <a:r>
+              <a:rPr lang="en-GB" sz="1400" dirty="0" smtClean="0"/>
+              <a:t>bean for </a:t>
+            </a:r>
+            <a:r>
+              <a:rPr lang="en-GB" sz="1400" dirty="0" err="1" smtClean="0"/>
+              <a:t>webservice</a:t>
+            </a:r>
+            <a:r>
+              <a:rPr lang="en-GB" sz="1400" dirty="0" smtClean="0"/>
+              <a:t> call</a:t>
+            </a:r>
+            <a:endParaRPr lang="en-GB" sz="1400" dirty="0"/>
+          </a:p>
+        </p:txBody>
+      </p:sp>
+      <p:cxnSp>
+        <p:nvCxnSpPr>
+          <p:cNvPr id="60" name="Curved Connector 59"/>
+          <p:cNvCxnSpPr>
+            <a:stCxn id="31" idx="3"/>
+            <a:endCxn id="50" idx="2"/>
+          </p:cNvCxnSpPr>
+          <p:nvPr/>
+        </p:nvCxnSpPr>
+        <p:spPr>
+          <a:xfrm flipV="1">
+            <a:off x="6152857" y="2708920"/>
+            <a:ext cx="1867925" cy="1080120"/>
+          </a:xfrm>
+          <a:prstGeom prst="curvedConnector2">
+            <a:avLst/>
+          </a:prstGeom>
+          <a:ln w="25400">
+            <a:solidFill>
+              <a:schemeClr val="bg1">
+                <a:lumMod val="50000"/>
+              </a:schemeClr>
+            </a:solidFill>
+            <a:prstDash val="sysDash"/>
+            <a:tailEnd type="triangle" w="lg" len="lg"/>
+          </a:ln>
+        </p:spPr>
+        <p:style>
+          <a:lnRef idx="1">
+            <a:schemeClr val="accent1"/>
+          </a:lnRef>
+          <a:fillRef idx="0">
+            <a:schemeClr val="accent1"/>
+          </a:fillRef>
+          <a:effectRef idx="0">
+            <a:schemeClr val="accent1"/>
+          </a:effectRef>
+          <a:fontRef idx="minor">
+            <a:schemeClr val="tx1"/>
+          </a:fontRef>
+        </p:style>
+      </p:cxnSp>
+      <p:sp>
+        <p:nvSpPr>
+          <p:cNvPr id="54" name="Rectangle 53"/>
+          <p:cNvSpPr/>
+          <p:nvPr/>
+        </p:nvSpPr>
+        <p:spPr>
+          <a:xfrm>
+            <a:off x="2555776" y="5803985"/>
+            <a:ext cx="3988282" cy="937383"/>
+          </a:xfrm>
+          <a:prstGeom prst="rect">
+            <a:avLst/>
+          </a:prstGeom>
+        </p:spPr>
+        <p:style>
+          <a:lnRef idx="2">
+            <a:schemeClr val="accent3"/>
+          </a:lnRef>
+          <a:fillRef idx="1">
+            <a:schemeClr val="lt1"/>
+          </a:fillRef>
+          <a:effectRef idx="0">
+            <a:schemeClr val="accent3"/>
+          </a:effectRef>
+          <a:fontRef idx="minor">
+            <a:schemeClr val="dk1"/>
+          </a:fontRef>
+        </p:style>
+        <p:txBody>
+          <a:bodyPr rot="0" spcFirstLastPara="0" vertOverflow="overflow" horzOverflow="overflow" vert="horz" wrap="square" lIns="91440" tIns="45720" rIns="91440" bIns="45720" numCol="1" spcCol="0" rtlCol="0" fromWordArt="0" anchor="b" anchorCtr="0" forceAA="0" compatLnSpc="1">
+            <a:prstTxWarp prst="textNoShape">
+              <a:avLst/>
+            </a:prstTxWarp>
+            <a:noAutofit/>
+          </a:bodyPr>
+          <a:lstStyle/>
+          <a:p>
+            <a:r>
+              <a:rPr lang="en-GB" dirty="0" smtClean="0"/>
+              <a:t>Bus</a:t>
+            </a:r>
+            <a:endParaRPr lang="en-GB" dirty="0"/>
+          </a:p>
+        </p:txBody>
+      </p:sp>
+      <p:sp>
+        <p:nvSpPr>
+          <p:cNvPr id="46" name="Rounded Rectangle 45"/>
+          <p:cNvSpPr/>
+          <p:nvPr/>
+        </p:nvSpPr>
+        <p:spPr>
+          <a:xfrm>
+            <a:off x="2723110" y="4581128"/>
+            <a:ext cx="1512168" cy="720080"/>
+          </a:xfrm>
+          <a:prstGeom prst="roundRect">
+            <a:avLst/>
+          </a:prstGeom>
+        </p:spPr>
+        <p:style>
+          <a:lnRef idx="2">
+            <a:schemeClr val="accent3">
+              <a:shade val="50000"/>
+            </a:schemeClr>
+          </a:lnRef>
+          <a:fillRef idx="1">
+            <a:schemeClr val="accent3"/>
+          </a:fillRef>
+          <a:effectRef idx="0">
+            <a:schemeClr val="accent3"/>
+          </a:effectRef>
+          <a:fontRef idx="minor">
+            <a:schemeClr val="lt1"/>
+          </a:fontRef>
+        </p:style>
+        <p:txBody>
+          <a:bodyPr rtlCol="0" anchor="ctr"/>
+          <a:lstStyle/>
+          <a:p>
+            <a:pPr algn="ctr"/>
+            <a:r>
+              <a:rPr lang="en-GB" sz="1400" dirty="0" err="1" smtClean="0"/>
+              <a:t>DataFormat</a:t>
+            </a:r>
+            <a:r>
+              <a:rPr lang="en-GB" sz="1400" dirty="0" smtClean="0"/>
+              <a:t> bean for payload </a:t>
+            </a:r>
+            <a:r>
+              <a:rPr lang="en-GB" sz="1400" dirty="0" err="1" smtClean="0"/>
+              <a:t>repr</a:t>
+            </a:r>
+            <a:endParaRPr lang="en-GB" sz="1400" dirty="0"/>
+          </a:p>
+        </p:txBody>
+      </p:sp>
+      <p:sp>
+        <p:nvSpPr>
+          <p:cNvPr id="49" name="Rounded Rectangle 48"/>
+          <p:cNvSpPr/>
+          <p:nvPr/>
+        </p:nvSpPr>
+        <p:spPr>
+          <a:xfrm>
+            <a:off x="3707904" y="5898816"/>
+            <a:ext cx="1512168" cy="720080"/>
+          </a:xfrm>
+          <a:prstGeom prst="roundRect">
+            <a:avLst/>
+          </a:prstGeom>
+        </p:spPr>
+        <p:style>
+          <a:lnRef idx="2">
+            <a:schemeClr val="accent1">
+              <a:shade val="50000"/>
+            </a:schemeClr>
+          </a:lnRef>
+          <a:fillRef idx="1">
+            <a:schemeClr val="accent1"/>
+          </a:fillRef>
+          <a:effectRef idx="0">
+            <a:schemeClr val="accent1"/>
+          </a:effectRef>
+          <a:fontRef idx="minor">
+            <a:schemeClr val="lt1"/>
+          </a:fontRef>
+        </p:style>
+        <p:txBody>
+          <a:bodyPr rtlCol="0" anchor="ctr"/>
+          <a:lstStyle/>
+          <a:p>
+            <a:pPr algn="ctr"/>
+            <a:r>
+              <a:rPr lang="en-GB" sz="1400" dirty="0" smtClean="0"/>
+              <a:t>Canonical payload </a:t>
+            </a:r>
+            <a:r>
+              <a:rPr lang="en-GB" sz="1400" dirty="0" err="1" smtClean="0"/>
+              <a:t>repr</a:t>
+            </a:r>
+            <a:endParaRPr lang="en-GB" sz="1400" dirty="0"/>
+          </a:p>
+        </p:txBody>
+      </p:sp>
+      <p:sp>
+        <p:nvSpPr>
+          <p:cNvPr id="63" name="Left Brace 62"/>
+          <p:cNvSpPr/>
+          <p:nvPr/>
+        </p:nvSpPr>
+        <p:spPr>
+          <a:xfrm rot="5400000">
+            <a:off x="5616116" y="-2851953"/>
+            <a:ext cx="288032" cy="6408712"/>
+          </a:xfrm>
+          <a:prstGeom prst="leftBrace">
+            <a:avLst>
+              <a:gd name="adj1" fmla="val 69384"/>
+              <a:gd name="adj2" fmla="val 50000"/>
+            </a:avLst>
+          </a:prstGeom>
+        </p:spPr>
+        <p:style>
+          <a:lnRef idx="1">
+            <a:schemeClr val="accent2"/>
+          </a:lnRef>
+          <a:fillRef idx="0">
+            <a:schemeClr val="accent2"/>
+          </a:fillRef>
+          <a:effectRef idx="0">
+            <a:schemeClr val="accent2"/>
+          </a:effectRef>
+          <a:fontRef idx="minor">
+            <a:schemeClr val="tx1"/>
+          </a:fontRef>
+        </p:style>
+        <p:txBody>
+          <a:bodyPr rtlCol="0" anchor="ctr"/>
+          <a:lstStyle/>
+          <a:p>
+            <a:pPr algn="ctr"/>
+            <a:endParaRPr lang="en-GB"/>
+          </a:p>
+        </p:txBody>
+      </p:sp>
+      <p:sp>
+        <p:nvSpPr>
+          <p:cNvPr id="64" name="TextBox 63"/>
           <p:cNvSpPr txBox="1"/>
           <p:nvPr/>
         </p:nvSpPr>
         <p:spPr>
           <a:xfrm>
-            <a:off x="4644008" y="4221088"/>
-            <a:ext cx="1597425" cy="646331"/>
+            <a:off x="5004048" y="-27384"/>
+            <a:ext cx="1821488" cy="276999"/>
           </a:xfrm>
           <a:prstGeom prst="rect">
             <a:avLst/>
@@ -4419,343 +4841,24 @@
           <a:noFill/>
         </p:spPr>
         <p:txBody>
-          <a:bodyPr wrap="none" rtlCol="0">
+          <a:bodyPr wrap="square" rtlCol="0">
             <a:spAutoFit/>
           </a:bodyPr>
           <a:lstStyle/>
           <a:p>
             <a:r>
-              <a:rPr lang="en-GB" sz="1200" dirty="0" smtClean="0"/>
-              <a:t>Compile-time</a:t>
-            </a:r>
-            <a:br>
-              <a:rPr lang="en-GB" sz="1200" dirty="0" smtClean="0"/>
-            </a:br>
-            <a:r>
-              <a:rPr lang="en-GB" sz="1200" dirty="0" smtClean="0"/>
-              <a:t>generation from WSDL</a:t>
-            </a:r>
-            <a:br>
-              <a:rPr lang="en-GB" sz="1200" dirty="0" smtClean="0"/>
-            </a:br>
-            <a:r>
-              <a:rPr lang="en-GB" sz="1200" dirty="0" smtClean="0"/>
-              <a:t>(doc-lit)</a:t>
-            </a:r>
-            <a:endParaRPr lang="en-GB" sz="1200" dirty="0"/>
-          </a:p>
-        </p:txBody>
-      </p:sp>
-      <p:sp>
-        <p:nvSpPr>
-          <p:cNvPr id="53" name="TextBox 52"/>
-          <p:cNvSpPr txBox="1"/>
-          <p:nvPr/>
-        </p:nvSpPr>
-        <p:spPr>
-          <a:xfrm>
-            <a:off x="3970886" y="3356992"/>
-            <a:ext cx="1393202" cy="461665"/>
-          </a:xfrm>
-          <a:prstGeom prst="rect">
-            <a:avLst/>
-          </a:prstGeom>
-          <a:noFill/>
-        </p:spPr>
-        <p:txBody>
-          <a:bodyPr wrap="none" rtlCol="0">
-            <a:spAutoFit/>
-          </a:bodyPr>
-          <a:lstStyle/>
-          <a:p>
-            <a:pPr algn="ctr"/>
-            <a:r>
-              <a:rPr lang="en-GB" sz="1200" dirty="0" smtClean="0"/>
-              <a:t>Query then invokes</a:t>
-            </a:r>
-            <a:br>
-              <a:rPr lang="en-GB" sz="1200" dirty="0" smtClean="0"/>
-            </a:br>
-            <a:r>
-              <a:rPr lang="en-GB" sz="1200" dirty="0" smtClean="0"/>
-              <a:t>@Consumed</a:t>
-            </a:r>
-            <a:endParaRPr lang="en-GB" sz="1200" dirty="0"/>
-          </a:p>
-        </p:txBody>
-      </p:sp>
-      <p:sp>
-        <p:nvSpPr>
-          <p:cNvPr id="55" name="TextBox 54"/>
-          <p:cNvSpPr txBox="1"/>
-          <p:nvPr/>
-        </p:nvSpPr>
-        <p:spPr>
-          <a:xfrm>
-            <a:off x="1403648" y="3284984"/>
-            <a:ext cx="1484509" cy="461665"/>
-          </a:xfrm>
-          <a:prstGeom prst="rect">
-            <a:avLst/>
-          </a:prstGeom>
-          <a:noFill/>
-        </p:spPr>
-        <p:txBody>
-          <a:bodyPr wrap="none" rtlCol="0">
-            <a:spAutoFit/>
-          </a:bodyPr>
-          <a:lstStyle/>
-          <a:p>
-            <a:pPr algn="ctr"/>
-            <a:r>
-              <a:rPr lang="en-GB" sz="1200" dirty="0" smtClean="0"/>
-              <a:t>Persisted by</a:t>
-            </a:r>
-            <a:br>
-              <a:rPr lang="en-GB" sz="1200" dirty="0" smtClean="0"/>
-            </a:br>
-            <a:r>
-              <a:rPr lang="en-GB" sz="1200" dirty="0" err="1" smtClean="0"/>
-              <a:t>PublishingServiceJdo</a:t>
-            </a:r>
-            <a:endParaRPr lang="en-GB" sz="1200" dirty="0"/>
-          </a:p>
-        </p:txBody>
-      </p:sp>
-      <p:sp>
-        <p:nvSpPr>
-          <p:cNvPr id="56" name="TextBox 55"/>
-          <p:cNvSpPr txBox="1"/>
-          <p:nvPr/>
-        </p:nvSpPr>
-        <p:spPr>
-          <a:xfrm>
-            <a:off x="3059832" y="4141529"/>
-            <a:ext cx="788999" cy="1015663"/>
-          </a:xfrm>
-          <a:prstGeom prst="rect">
-            <a:avLst/>
-          </a:prstGeom>
-          <a:noFill/>
-        </p:spPr>
-        <p:txBody>
-          <a:bodyPr wrap="none" rtlCol="0">
-            <a:spAutoFit/>
-          </a:bodyPr>
-          <a:lstStyle/>
-          <a:p>
-            <a:r>
-              <a:rPr lang="en-GB" sz="6000" dirty="0" smtClean="0">
+              <a:rPr lang="en-GB" sz="1200" i="1" dirty="0" smtClean="0">
                 <a:solidFill>
-                  <a:srgbClr val="00B050"/>
+                  <a:srgbClr val="C00000"/>
                 </a:solidFill>
-                <a:sym typeface="Wingdings"/>
               </a:rPr>
-              <a:t></a:t>
-            </a:r>
-            <a:endParaRPr lang="en-GB" sz="6000" dirty="0">
+              <a:t>Scope of this project</a:t>
+            </a:r>
+            <a:endParaRPr lang="en-GB" sz="1200" i="1" dirty="0">
               <a:solidFill>
-                <a:srgbClr val="00B050"/>
+                <a:srgbClr val="C00000"/>
               </a:solidFill>
             </a:endParaRPr>
-          </a:p>
-        </p:txBody>
-      </p:sp>
-      <p:sp>
-        <p:nvSpPr>
-          <p:cNvPr id="57" name="TextBox 56"/>
-          <p:cNvSpPr txBox="1"/>
-          <p:nvPr/>
-        </p:nvSpPr>
-        <p:spPr>
-          <a:xfrm>
-            <a:off x="6202674" y="1844824"/>
-            <a:ext cx="673582" cy="1015663"/>
-          </a:xfrm>
-          <a:prstGeom prst="rect">
-            <a:avLst/>
-          </a:prstGeom>
-          <a:noFill/>
-        </p:spPr>
-        <p:txBody>
-          <a:bodyPr wrap="none" rtlCol="0">
-            <a:spAutoFit/>
-          </a:bodyPr>
-          <a:lstStyle>
-            <a:defPPr>
-              <a:defRPr lang="en-US"/>
-            </a:defPPr>
-            <a:lvl1pPr>
-              <a:defRPr sz="6000">
-                <a:solidFill>
-                  <a:srgbClr val="00B050"/>
-                </a:solidFill>
-              </a:defRPr>
-            </a:lvl1pPr>
-            <a:lvl2pPr>
-              <a:defRPr>
-                <a:solidFill>
-                  <a:schemeClr val="tx1"/>
-                </a:solidFill>
-              </a:defRPr>
-            </a:lvl2pPr>
-            <a:lvl3pPr>
-              <a:defRPr>
-                <a:solidFill>
-                  <a:schemeClr val="tx1"/>
-                </a:solidFill>
-              </a:defRPr>
-            </a:lvl3pPr>
-            <a:lvl4pPr>
-              <a:defRPr>
-                <a:solidFill>
-                  <a:schemeClr val="tx1"/>
-                </a:solidFill>
-              </a:defRPr>
-            </a:lvl4pPr>
-            <a:lvl5pPr>
-              <a:defRPr>
-                <a:solidFill>
-                  <a:schemeClr val="tx1"/>
-                </a:solidFill>
-              </a:defRPr>
-            </a:lvl5pPr>
-            <a:lvl6pPr>
-              <a:defRPr>
-                <a:solidFill>
-                  <a:schemeClr val="tx1"/>
-                </a:solidFill>
-              </a:defRPr>
-            </a:lvl6pPr>
-            <a:lvl7pPr>
-              <a:defRPr>
-                <a:solidFill>
-                  <a:schemeClr val="tx1"/>
-                </a:solidFill>
-              </a:defRPr>
-            </a:lvl7pPr>
-            <a:lvl8pPr>
-              <a:defRPr>
-                <a:solidFill>
-                  <a:schemeClr val="tx1"/>
-                </a:solidFill>
-              </a:defRPr>
-            </a:lvl8pPr>
-            <a:lvl9pPr>
-              <a:defRPr>
-                <a:solidFill>
-                  <a:schemeClr val="tx1"/>
-                </a:solidFill>
-              </a:defRPr>
-            </a:lvl9pPr>
-          </a:lstStyle>
-          <a:p>
-            <a:r>
-              <a:rPr lang="en-GB" dirty="0">
-                <a:solidFill>
-                  <a:srgbClr val="FF0000"/>
-                </a:solidFill>
-                <a:sym typeface="Wingdings"/>
-              </a:rPr>
-              <a:t></a:t>
-            </a:r>
-            <a:endParaRPr lang="en-GB" dirty="0">
-              <a:solidFill>
-                <a:srgbClr val="FF0000"/>
-              </a:solidFill>
-            </a:endParaRPr>
-          </a:p>
-        </p:txBody>
-      </p:sp>
-      <p:sp>
-        <p:nvSpPr>
-          <p:cNvPr id="59" name="Rounded Rectangular Callout 58"/>
-          <p:cNvSpPr/>
-          <p:nvPr/>
-        </p:nvSpPr>
-        <p:spPr>
-          <a:xfrm>
-            <a:off x="2915816" y="5589240"/>
-            <a:ext cx="1440160" cy="504056"/>
-          </a:xfrm>
-          <a:prstGeom prst="wedgeRoundRectCallout">
-            <a:avLst>
-              <a:gd name="adj1" fmla="val -20833"/>
-              <a:gd name="adj2" fmla="val -186250"/>
-              <a:gd name="adj3" fmla="val 16667"/>
-            </a:avLst>
-          </a:prstGeom>
-        </p:spPr>
-        <p:style>
-          <a:lnRef idx="1">
-            <a:schemeClr val="accent5"/>
-          </a:lnRef>
-          <a:fillRef idx="2">
-            <a:schemeClr val="accent5"/>
-          </a:fillRef>
-          <a:effectRef idx="1">
-            <a:schemeClr val="accent5"/>
-          </a:effectRef>
-          <a:fontRef idx="minor">
-            <a:schemeClr val="dk1"/>
-          </a:fontRef>
-        </p:style>
-        <p:txBody>
-          <a:bodyPr rtlCol="0" anchor="ctr"/>
-          <a:lstStyle/>
-          <a:p>
-            <a:pPr algn="ctr"/>
-            <a:r>
-              <a:rPr lang="en-GB" sz="1200" dirty="0" smtClean="0"/>
-              <a:t>This bit has been done</a:t>
-            </a:r>
-            <a:endParaRPr lang="en-GB" sz="1200" dirty="0"/>
-          </a:p>
-        </p:txBody>
-      </p:sp>
-      <p:sp>
-        <p:nvSpPr>
-          <p:cNvPr id="61" name="Rounded Rectangular Callout 60"/>
-          <p:cNvSpPr/>
-          <p:nvPr/>
-        </p:nvSpPr>
-        <p:spPr>
-          <a:xfrm>
-            <a:off x="7272300" y="1543599"/>
-            <a:ext cx="1440160" cy="746466"/>
-          </a:xfrm>
-          <a:prstGeom prst="wedgeRoundRectCallout">
-            <a:avLst>
-              <a:gd name="adj1" fmla="val -90820"/>
-              <a:gd name="adj2" fmla="val 55014"/>
-              <a:gd name="adj3" fmla="val 16667"/>
-            </a:avLst>
-          </a:prstGeom>
-        </p:spPr>
-        <p:style>
-          <a:lnRef idx="1">
-            <a:schemeClr val="accent5"/>
-          </a:lnRef>
-          <a:fillRef idx="2">
-            <a:schemeClr val="accent5"/>
-          </a:fillRef>
-          <a:effectRef idx="1">
-            <a:schemeClr val="accent5"/>
-          </a:effectRef>
-          <a:fontRef idx="minor">
-            <a:schemeClr val="dk1"/>
-          </a:fontRef>
-        </p:style>
-        <p:txBody>
-          <a:bodyPr rtlCol="0" anchor="ctr"/>
-          <a:lstStyle/>
-          <a:p>
-            <a:pPr algn="ctr"/>
-            <a:r>
-              <a:rPr lang="en-GB" sz="1200" dirty="0" smtClean="0"/>
-              <a:t>This route and an appropriate WSDL has not yet been done</a:t>
-            </a:r>
-            <a:endParaRPr lang="en-GB" sz="1200" dirty="0"/>
           </a:p>
         </p:txBody>
       </p:sp>

</xml_diff>